<commit_message>
added Florian and Anca's comments, sensitivity analysis and final grasping in clutter results
</commit_message>
<xml_diff>
--- a/figures/teaser.pptx
+++ b/figures/teaser.pptx
@@ -288,7 +288,7 @@
           <a:p>
             <a:fld id="{4B2286AD-5452-9345-A613-F4287A508AD1}" type="datetimeFigureOut">
               <a:rPr lang="en-US" smtClean="0"/>
-              <a:t>8/17/15</a:t>
+              <a:t>8/21/15</a:t>
             </a:fld>
             <a:endParaRPr lang="en-US"/>
           </a:p>
@@ -458,7 +458,7 @@
           <a:p>
             <a:fld id="{4B2286AD-5452-9345-A613-F4287A508AD1}" type="datetimeFigureOut">
               <a:rPr lang="en-US" smtClean="0"/>
-              <a:t>8/17/15</a:t>
+              <a:t>8/21/15</a:t>
             </a:fld>
             <a:endParaRPr lang="en-US"/>
           </a:p>
@@ -638,7 +638,7 @@
           <a:p>
             <a:fld id="{4B2286AD-5452-9345-A613-F4287A508AD1}" type="datetimeFigureOut">
               <a:rPr lang="en-US" smtClean="0"/>
-              <a:t>8/17/15</a:t>
+              <a:t>8/21/15</a:t>
             </a:fld>
             <a:endParaRPr lang="en-US"/>
           </a:p>
@@ -808,7 +808,7 @@
           <a:p>
             <a:fld id="{4B2286AD-5452-9345-A613-F4287A508AD1}" type="datetimeFigureOut">
               <a:rPr lang="en-US" smtClean="0"/>
-              <a:t>8/17/15</a:t>
+              <a:t>8/21/15</a:t>
             </a:fld>
             <a:endParaRPr lang="en-US"/>
           </a:p>
@@ -1054,7 +1054,7 @@
           <a:p>
             <a:fld id="{4B2286AD-5452-9345-A613-F4287A508AD1}" type="datetimeFigureOut">
               <a:rPr lang="en-US" smtClean="0"/>
-              <a:t>8/17/15</a:t>
+              <a:t>8/21/15</a:t>
             </a:fld>
             <a:endParaRPr lang="en-US"/>
           </a:p>
@@ -1342,7 +1342,7 @@
           <a:p>
             <a:fld id="{4B2286AD-5452-9345-A613-F4287A508AD1}" type="datetimeFigureOut">
               <a:rPr lang="en-US" smtClean="0"/>
-              <a:t>8/17/15</a:t>
+              <a:t>8/21/15</a:t>
             </a:fld>
             <a:endParaRPr lang="en-US"/>
           </a:p>
@@ -1764,7 +1764,7 @@
           <a:p>
             <a:fld id="{4B2286AD-5452-9345-A613-F4287A508AD1}" type="datetimeFigureOut">
               <a:rPr lang="en-US" smtClean="0"/>
-              <a:t>8/17/15</a:t>
+              <a:t>8/21/15</a:t>
             </a:fld>
             <a:endParaRPr lang="en-US"/>
           </a:p>
@@ -1882,7 +1882,7 @@
           <a:p>
             <a:fld id="{4B2286AD-5452-9345-A613-F4287A508AD1}" type="datetimeFigureOut">
               <a:rPr lang="en-US" smtClean="0"/>
-              <a:t>8/17/15</a:t>
+              <a:t>8/21/15</a:t>
             </a:fld>
             <a:endParaRPr lang="en-US"/>
           </a:p>
@@ -1977,7 +1977,7 @@
           <a:p>
             <a:fld id="{4B2286AD-5452-9345-A613-F4287A508AD1}" type="datetimeFigureOut">
               <a:rPr lang="en-US" smtClean="0"/>
-              <a:t>8/17/15</a:t>
+              <a:t>8/21/15</a:t>
             </a:fld>
             <a:endParaRPr lang="en-US"/>
           </a:p>
@@ -2254,7 +2254,7 @@
           <a:p>
             <a:fld id="{4B2286AD-5452-9345-A613-F4287A508AD1}" type="datetimeFigureOut">
               <a:rPr lang="en-US" smtClean="0"/>
-              <a:t>8/17/15</a:t>
+              <a:t>8/21/15</a:t>
             </a:fld>
             <a:endParaRPr lang="en-US"/>
           </a:p>
@@ -2507,7 +2507,7 @@
           <a:p>
             <a:fld id="{4B2286AD-5452-9345-A613-F4287A508AD1}" type="datetimeFigureOut">
               <a:rPr lang="en-US" smtClean="0"/>
-              <a:t>8/17/15</a:t>
+              <a:t>8/21/15</a:t>
             </a:fld>
             <a:endParaRPr lang="en-US"/>
           </a:p>
@@ -2720,7 +2720,7 @@
           <a:p>
             <a:fld id="{4B2286AD-5452-9345-A613-F4287A508AD1}" type="datetimeFigureOut">
               <a:rPr lang="en-US" smtClean="0"/>
-              <a:t>8/17/15</a:t>
+              <a:t>8/21/15</a:t>
             </a:fld>
             <a:endParaRPr lang="en-US"/>
           </a:p>
@@ -3116,8 +3116,8 @@
         </p:blipFill>
         <p:spPr>
           <a:xfrm>
-            <a:off x="128619" y="89285"/>
-            <a:ext cx="2845693" cy="2910317"/>
+            <a:off x="1841061" y="0"/>
+            <a:ext cx="2650774" cy="2710972"/>
           </a:xfrm>
           <a:prstGeom prst="rect">
             <a:avLst/>
@@ -3148,17 +3148,128 @@
         </p:blipFill>
         <p:spPr>
           <a:xfrm>
-            <a:off x="2885387" y="92546"/>
-            <a:ext cx="2877844" cy="2907056"/>
+            <a:off x="5554168" y="0"/>
+            <a:ext cx="3260467" cy="3293563"/>
           </a:xfrm>
           <a:prstGeom prst="rect">
             <a:avLst/>
           </a:prstGeom>
         </p:spPr>
       </p:pic>
+      <p:sp>
+        <p:nvSpPr>
+          <p:cNvPr id="10" name="TextBox 9"/>
+          <p:cNvSpPr txBox="1"/>
+          <p:nvPr/>
+        </p:nvSpPr>
+        <p:spPr>
+          <a:xfrm>
+            <a:off x="1841061" y="2785732"/>
+            <a:ext cx="2217689" cy="338554"/>
+          </a:xfrm>
+          <a:prstGeom prst="rect">
+            <a:avLst/>
+          </a:prstGeom>
+          <a:noFill/>
+        </p:spPr>
+        <p:txBody>
+          <a:bodyPr wrap="square" rtlCol="0">
+            <a:spAutoFit/>
+          </a:bodyPr>
+          <a:lstStyle/>
+          <a:p>
+            <a:pPr algn="ctr"/>
+            <a:r>
+              <a:rPr lang="en-US" sz="1600" dirty="0" smtClean="0">
+                <a:latin typeface="Palatino"/>
+                <a:cs typeface="Palatino"/>
+              </a:rPr>
+              <a:t>(a) Driving Simulator </a:t>
+            </a:r>
+            <a:endParaRPr lang="en-US" sz="1600" dirty="0">
+              <a:latin typeface="Palatino"/>
+              <a:cs typeface="Palatino"/>
+            </a:endParaRPr>
+          </a:p>
+        </p:txBody>
+      </p:sp>
+      <p:sp>
+        <p:nvSpPr>
+          <p:cNvPr id="11" name="TextBox 10"/>
+          <p:cNvSpPr txBox="1"/>
+          <p:nvPr/>
+        </p:nvSpPr>
+        <p:spPr>
+          <a:xfrm>
+            <a:off x="5554168" y="3366988"/>
+            <a:ext cx="2564839" cy="338554"/>
+          </a:xfrm>
+          <a:prstGeom prst="rect">
+            <a:avLst/>
+          </a:prstGeom>
+          <a:noFill/>
+        </p:spPr>
+        <p:txBody>
+          <a:bodyPr wrap="square" rtlCol="0">
+            <a:spAutoFit/>
+          </a:bodyPr>
+          <a:lstStyle/>
+          <a:p>
+            <a:pPr algn="ctr"/>
+            <a:r>
+              <a:rPr lang="en-US" sz="1600" dirty="0" smtClean="0">
+                <a:latin typeface="Palatino"/>
+                <a:cs typeface="Palatino"/>
+              </a:rPr>
+              <a:t>(b) Grasping in Clutter</a:t>
+            </a:r>
+            <a:endParaRPr lang="en-US" sz="1600" dirty="0">
+              <a:latin typeface="Palatino"/>
+              <a:cs typeface="Palatino"/>
+            </a:endParaRPr>
+          </a:p>
+        </p:txBody>
+      </p:sp>
+      <p:sp>
+        <p:nvSpPr>
+          <p:cNvPr id="12" name="TextBox 11"/>
+          <p:cNvSpPr txBox="1"/>
+          <p:nvPr/>
+        </p:nvSpPr>
+        <p:spPr>
+          <a:xfrm>
+            <a:off x="1701967" y="6468888"/>
+            <a:ext cx="2998762" cy="338554"/>
+          </a:xfrm>
+          <a:prstGeom prst="rect">
+            <a:avLst/>
+          </a:prstGeom>
+          <a:noFill/>
+        </p:spPr>
+        <p:txBody>
+          <a:bodyPr wrap="square" rtlCol="0">
+            <a:spAutoFit/>
+          </a:bodyPr>
+          <a:lstStyle/>
+          <a:p>
+            <a:pPr algn="ctr"/>
+            <a:r>
+              <a:rPr lang="en-US" sz="1600" dirty="0" smtClean="0">
+                <a:latin typeface="Palatino"/>
+                <a:cs typeface="Palatino"/>
+              </a:rPr>
+              <a:t>(c) Needle Insertion on DVRK</a:t>
+            </a:r>
+            <a:endParaRPr lang="en-US" sz="1600" dirty="0">
+              <a:latin typeface="Palatino"/>
+              <a:cs typeface="Palatino"/>
+            </a:endParaRPr>
+          </a:p>
+        </p:txBody>
+      </p:sp>
       <p:pic>
         <p:nvPicPr>
-          <p:cNvPr id="6" name="Picture 5" descr="Needle.jpg"/>
+          <p:cNvPr id="13" name="Picture 12" descr="needle_insertion_results.eps"/>
           <p:cNvPicPr>
             <a:picLocks noChangeAspect="1"/>
           </p:cNvPicPr>
@@ -3178,163 +3289,17 @@
         </p:blipFill>
         <p:spPr>
           <a:xfrm>
-            <a:off x="5715000" y="89285"/>
-            <a:ext cx="3429000" cy="2816352"/>
+            <a:off x="4700729" y="3773830"/>
+            <a:ext cx="4175589" cy="2695058"/>
           </a:xfrm>
           <a:prstGeom prst="rect">
             <a:avLst/>
           </a:prstGeom>
         </p:spPr>
       </p:pic>
-      <p:sp>
-        <p:nvSpPr>
-          <p:cNvPr id="10" name="TextBox 9"/>
-          <p:cNvSpPr txBox="1"/>
-          <p:nvPr/>
-        </p:nvSpPr>
-        <p:spPr>
-          <a:xfrm>
-            <a:off x="128619" y="3002829"/>
-            <a:ext cx="2217689" cy="338554"/>
-          </a:xfrm>
-          <a:prstGeom prst="rect">
-            <a:avLst/>
-          </a:prstGeom>
-          <a:noFill/>
-        </p:spPr>
-        <p:txBody>
-          <a:bodyPr wrap="square" rtlCol="0">
-            <a:spAutoFit/>
-          </a:bodyPr>
-          <a:lstStyle/>
-          <a:p>
-            <a:pPr algn="ctr"/>
-            <a:r>
-              <a:rPr lang="en-US" sz="1600" dirty="0" smtClean="0">
-                <a:latin typeface="Palatino"/>
-                <a:cs typeface="Palatino"/>
-              </a:rPr>
-              <a:t>(a</a:t>
-            </a:r>
-            <a:r>
-              <a:rPr lang="en-US" sz="1600" smtClean="0">
-                <a:latin typeface="Palatino"/>
-                <a:cs typeface="Palatino"/>
-              </a:rPr>
-              <a:t>) </a:t>
-            </a:r>
-            <a:r>
-              <a:rPr lang="en-US" sz="1600" smtClean="0">
-                <a:latin typeface="Palatino"/>
-                <a:cs typeface="Palatino"/>
-              </a:rPr>
-              <a:t>Driving</a:t>
-            </a:r>
-            <a:r>
-              <a:rPr lang="en-US" sz="1600" smtClean="0">
-                <a:latin typeface="Palatino"/>
-                <a:cs typeface="Palatino"/>
-              </a:rPr>
-              <a:t> </a:t>
-            </a:r>
-            <a:r>
-              <a:rPr lang="en-US" sz="1600" dirty="0" smtClean="0">
-                <a:latin typeface="Palatino"/>
-                <a:cs typeface="Palatino"/>
-              </a:rPr>
-              <a:t>Simulator </a:t>
-            </a:r>
-            <a:endParaRPr lang="en-US" sz="1600" dirty="0">
-              <a:latin typeface="Palatino"/>
-              <a:cs typeface="Palatino"/>
-            </a:endParaRPr>
-          </a:p>
-        </p:txBody>
-      </p:sp>
-      <p:sp>
-        <p:nvSpPr>
-          <p:cNvPr id="11" name="TextBox 10"/>
-          <p:cNvSpPr txBox="1"/>
-          <p:nvPr/>
-        </p:nvSpPr>
-        <p:spPr>
-          <a:xfrm>
-            <a:off x="2676386" y="2982974"/>
-            <a:ext cx="2564839" cy="338554"/>
-          </a:xfrm>
-          <a:prstGeom prst="rect">
-            <a:avLst/>
-          </a:prstGeom>
-          <a:noFill/>
-        </p:spPr>
-        <p:txBody>
-          <a:bodyPr wrap="square" rtlCol="0">
-            <a:spAutoFit/>
-          </a:bodyPr>
-          <a:lstStyle/>
-          <a:p>
-            <a:pPr algn="ctr"/>
-            <a:r>
-              <a:rPr lang="en-US" sz="1600" dirty="0" smtClean="0">
-                <a:latin typeface="Palatino"/>
-                <a:cs typeface="Palatino"/>
-              </a:rPr>
-              <a:t>(b) </a:t>
-            </a:r>
-            <a:r>
-              <a:rPr lang="en-US" sz="1600" dirty="0" smtClean="0">
-                <a:latin typeface="Palatino"/>
-                <a:cs typeface="Palatino"/>
-              </a:rPr>
-              <a:t>Grasping in Clutter</a:t>
-            </a:r>
-            <a:endParaRPr lang="en-US" sz="1600" dirty="0">
-              <a:latin typeface="Palatino"/>
-              <a:cs typeface="Palatino"/>
-            </a:endParaRPr>
-          </a:p>
-        </p:txBody>
-      </p:sp>
-      <p:sp>
-        <p:nvSpPr>
-          <p:cNvPr id="12" name="TextBox 11"/>
-          <p:cNvSpPr txBox="1"/>
-          <p:nvPr/>
-        </p:nvSpPr>
-        <p:spPr>
-          <a:xfrm>
-            <a:off x="5554400" y="2999602"/>
-            <a:ext cx="2998762" cy="338554"/>
-          </a:xfrm>
-          <a:prstGeom prst="rect">
-            <a:avLst/>
-          </a:prstGeom>
-          <a:noFill/>
-        </p:spPr>
-        <p:txBody>
-          <a:bodyPr wrap="square" rtlCol="0">
-            <a:spAutoFit/>
-          </a:bodyPr>
-          <a:lstStyle/>
-          <a:p>
-            <a:pPr algn="ctr"/>
-            <a:r>
-              <a:rPr lang="en-US" sz="1600" dirty="0" smtClean="0">
-                <a:latin typeface="Palatino"/>
-                <a:cs typeface="Palatino"/>
-              </a:rPr>
-              <a:t>(c) Needle Insertion on DVRK</a:t>
-            </a:r>
-            <a:endParaRPr lang="en-US" sz="1600" dirty="0">
-              <a:latin typeface="Palatino"/>
-              <a:cs typeface="Palatino"/>
-            </a:endParaRPr>
-          </a:p>
-        </p:txBody>
-      </p:sp>
       <p:pic>
         <p:nvPicPr>
-          <p:cNvPr id="13" name="Picture 12" descr="needle_insertion_results.eps"/>
+          <p:cNvPr id="4" name="Picture 3" descr="NeedleInsertion-1-2.jpg"/>
           <p:cNvPicPr>
             <a:picLocks noChangeAspect="1"/>
           </p:cNvPicPr>
@@ -3354,8 +3319,8 @@
         </p:blipFill>
         <p:spPr>
           <a:xfrm>
-            <a:off x="639076" y="3444302"/>
-            <a:ext cx="8376306" cy="3413698"/>
+            <a:off x="1801994" y="3393454"/>
+            <a:ext cx="2552857" cy="2961686"/>
           </a:xfrm>
           <a:prstGeom prst="rect">
             <a:avLst/>

</xml_diff>

<commit_message>
added Ken's feedback, changed One Class SVM, added discussion on hyperparameters
</commit_message>
<xml_diff>
--- a/figures/teaser.pptx
+++ b/figures/teaser.pptx
@@ -288,7 +288,7 @@
           <a:p>
             <a:fld id="{4B2286AD-5452-9345-A613-F4287A508AD1}" type="datetimeFigureOut">
               <a:rPr lang="en-US" smtClean="0"/>
-              <a:t>8/21/15</a:t>
+              <a:t>8/31/15</a:t>
             </a:fld>
             <a:endParaRPr lang="en-US"/>
           </a:p>
@@ -458,7 +458,7 @@
           <a:p>
             <a:fld id="{4B2286AD-5452-9345-A613-F4287A508AD1}" type="datetimeFigureOut">
               <a:rPr lang="en-US" smtClean="0"/>
-              <a:t>8/21/15</a:t>
+              <a:t>8/31/15</a:t>
             </a:fld>
             <a:endParaRPr lang="en-US"/>
           </a:p>
@@ -638,7 +638,7 @@
           <a:p>
             <a:fld id="{4B2286AD-5452-9345-A613-F4287A508AD1}" type="datetimeFigureOut">
               <a:rPr lang="en-US" smtClean="0"/>
-              <a:t>8/21/15</a:t>
+              <a:t>8/31/15</a:t>
             </a:fld>
             <a:endParaRPr lang="en-US"/>
           </a:p>
@@ -808,7 +808,7 @@
           <a:p>
             <a:fld id="{4B2286AD-5452-9345-A613-F4287A508AD1}" type="datetimeFigureOut">
               <a:rPr lang="en-US" smtClean="0"/>
-              <a:t>8/21/15</a:t>
+              <a:t>8/31/15</a:t>
             </a:fld>
             <a:endParaRPr lang="en-US"/>
           </a:p>
@@ -1054,7 +1054,7 @@
           <a:p>
             <a:fld id="{4B2286AD-5452-9345-A613-F4287A508AD1}" type="datetimeFigureOut">
               <a:rPr lang="en-US" smtClean="0"/>
-              <a:t>8/21/15</a:t>
+              <a:t>8/31/15</a:t>
             </a:fld>
             <a:endParaRPr lang="en-US"/>
           </a:p>
@@ -1342,7 +1342,7 @@
           <a:p>
             <a:fld id="{4B2286AD-5452-9345-A613-F4287A508AD1}" type="datetimeFigureOut">
               <a:rPr lang="en-US" smtClean="0"/>
-              <a:t>8/21/15</a:t>
+              <a:t>8/31/15</a:t>
             </a:fld>
             <a:endParaRPr lang="en-US"/>
           </a:p>
@@ -1764,7 +1764,7 @@
           <a:p>
             <a:fld id="{4B2286AD-5452-9345-A613-F4287A508AD1}" type="datetimeFigureOut">
               <a:rPr lang="en-US" smtClean="0"/>
-              <a:t>8/21/15</a:t>
+              <a:t>8/31/15</a:t>
             </a:fld>
             <a:endParaRPr lang="en-US"/>
           </a:p>
@@ -1882,7 +1882,7 @@
           <a:p>
             <a:fld id="{4B2286AD-5452-9345-A613-F4287A508AD1}" type="datetimeFigureOut">
               <a:rPr lang="en-US" smtClean="0"/>
-              <a:t>8/21/15</a:t>
+              <a:t>8/31/15</a:t>
             </a:fld>
             <a:endParaRPr lang="en-US"/>
           </a:p>
@@ -1977,7 +1977,7 @@
           <a:p>
             <a:fld id="{4B2286AD-5452-9345-A613-F4287A508AD1}" type="datetimeFigureOut">
               <a:rPr lang="en-US" smtClean="0"/>
-              <a:t>8/21/15</a:t>
+              <a:t>8/31/15</a:t>
             </a:fld>
             <a:endParaRPr lang="en-US"/>
           </a:p>
@@ -2254,7 +2254,7 @@
           <a:p>
             <a:fld id="{4B2286AD-5452-9345-A613-F4287A508AD1}" type="datetimeFigureOut">
               <a:rPr lang="en-US" smtClean="0"/>
-              <a:t>8/21/15</a:t>
+              <a:t>8/31/15</a:t>
             </a:fld>
             <a:endParaRPr lang="en-US"/>
           </a:p>
@@ -2507,7 +2507,7 @@
           <a:p>
             <a:fld id="{4B2286AD-5452-9345-A613-F4287A508AD1}" type="datetimeFigureOut">
               <a:rPr lang="en-US" smtClean="0"/>
-              <a:t>8/21/15</a:t>
+              <a:t>8/31/15</a:t>
             </a:fld>
             <a:endParaRPr lang="en-US"/>
           </a:p>
@@ -2720,7 +2720,7 @@
           <a:p>
             <a:fld id="{4B2286AD-5452-9345-A613-F4287A508AD1}" type="datetimeFigureOut">
               <a:rPr lang="en-US" smtClean="0"/>
-              <a:t>8/21/15</a:t>
+              <a:t>8/31/15</a:t>
             </a:fld>
             <a:endParaRPr lang="en-US"/>
           </a:p>
@@ -3201,8 +3201,8 @@
         </p:nvSpPr>
         <p:spPr>
           <a:xfrm>
-            <a:off x="5554168" y="3366988"/>
-            <a:ext cx="2564839" cy="338554"/>
+            <a:off x="5326412" y="3366988"/>
+            <a:ext cx="3199784" cy="338554"/>
           </a:xfrm>
           <a:prstGeom prst="rect">
             <a:avLst/>
@@ -3221,7 +3221,14 @@
                 <a:latin typeface="Palatino"/>
                 <a:cs typeface="Palatino"/>
               </a:rPr>
-              <a:t>(b) Grasping in Clutter</a:t>
+              <a:t>(b) Grasping in </a:t>
+            </a:r>
+            <a:r>
+              <a:rPr lang="en-US" sz="1600" dirty="0" smtClean="0">
+                <a:latin typeface="Palatino"/>
+                <a:cs typeface="Palatino"/>
+              </a:rPr>
+              <a:t>Clutter in Box2D</a:t>
             </a:r>
             <a:endParaRPr lang="en-US" sz="1600" dirty="0">
               <a:latin typeface="Palatino"/>
@@ -3258,7 +3265,21 @@
                 <a:latin typeface="Palatino"/>
                 <a:cs typeface="Palatino"/>
               </a:rPr>
-              <a:t>(c) Needle Insertion on DVRK</a:t>
+              <a:t>(c) </a:t>
+            </a:r>
+            <a:r>
+              <a:rPr lang="en-US" sz="1600" dirty="0" smtClean="0">
+                <a:latin typeface="Palatino"/>
+                <a:cs typeface="Palatino"/>
+              </a:rPr>
+              <a:t>Surgical Needle </a:t>
+            </a:r>
+            <a:r>
+              <a:rPr lang="en-US" sz="1600" dirty="0" smtClean="0">
+                <a:latin typeface="Palatino"/>
+                <a:cs typeface="Palatino"/>
+              </a:rPr>
+              <a:t>Insertion </a:t>
             </a:r>
             <a:endParaRPr lang="en-US" sz="1600" dirty="0">
               <a:latin typeface="Palatino"/>
@@ -3269,7 +3290,7 @@
       </p:sp>
       <p:pic>
         <p:nvPicPr>
-          <p:cNvPr id="13" name="Picture 12" descr="needle_insertion_results.eps"/>
+          <p:cNvPr id="4" name="Picture 3" descr="NeedleInsertion-1-2.jpg"/>
           <p:cNvPicPr>
             <a:picLocks noChangeAspect="1"/>
           </p:cNvPicPr>
@@ -3289,8 +3310,8 @@
         </p:blipFill>
         <p:spPr>
           <a:xfrm>
-            <a:off x="4700729" y="3773830"/>
-            <a:ext cx="4175589" cy="2695058"/>
+            <a:off x="1801994" y="3393454"/>
+            <a:ext cx="2552857" cy="2961686"/>
           </a:xfrm>
           <a:prstGeom prst="rect">
             <a:avLst/>
@@ -3299,7 +3320,7 @@
       </p:pic>
       <p:pic>
         <p:nvPicPr>
-          <p:cNvPr id="4" name="Picture 3" descr="NeedleInsertion-1-2.jpg"/>
+          <p:cNvPr id="2" name="Picture 1" descr="grasp_clutter.eps"/>
           <p:cNvPicPr>
             <a:picLocks noChangeAspect="1"/>
           </p:cNvPicPr>
@@ -3319,8 +3340,8 @@
         </p:blipFill>
         <p:spPr>
           <a:xfrm>
-            <a:off x="1801994" y="3393454"/>
-            <a:ext cx="2552857" cy="2961686"/>
+            <a:off x="4932591" y="3705542"/>
+            <a:ext cx="3882044" cy="2926464"/>
           </a:xfrm>
           <a:prstGeom prst="rect">
             <a:avLst/>

</xml_diff>

<commit_message>
updated figures, added limitations
</commit_message>
<xml_diff>
--- a/figures/teaser.pptx
+++ b/figures/teaser.pptx
@@ -288,7 +288,7 @@
           <a:p>
             <a:fld id="{4B2286AD-5452-9345-A613-F4287A508AD1}" type="datetimeFigureOut">
               <a:rPr lang="en-US" smtClean="0"/>
-              <a:t>8/31/15</a:t>
+              <a:t>9/4/15</a:t>
             </a:fld>
             <a:endParaRPr lang="en-US"/>
           </a:p>
@@ -458,7 +458,7 @@
           <a:p>
             <a:fld id="{4B2286AD-5452-9345-A613-F4287A508AD1}" type="datetimeFigureOut">
               <a:rPr lang="en-US" smtClean="0"/>
-              <a:t>8/31/15</a:t>
+              <a:t>9/4/15</a:t>
             </a:fld>
             <a:endParaRPr lang="en-US"/>
           </a:p>
@@ -638,7 +638,7 @@
           <a:p>
             <a:fld id="{4B2286AD-5452-9345-A613-F4287A508AD1}" type="datetimeFigureOut">
               <a:rPr lang="en-US" smtClean="0"/>
-              <a:t>8/31/15</a:t>
+              <a:t>9/4/15</a:t>
             </a:fld>
             <a:endParaRPr lang="en-US"/>
           </a:p>
@@ -808,7 +808,7 @@
           <a:p>
             <a:fld id="{4B2286AD-5452-9345-A613-F4287A508AD1}" type="datetimeFigureOut">
               <a:rPr lang="en-US" smtClean="0"/>
-              <a:t>8/31/15</a:t>
+              <a:t>9/4/15</a:t>
             </a:fld>
             <a:endParaRPr lang="en-US"/>
           </a:p>
@@ -1054,7 +1054,7 @@
           <a:p>
             <a:fld id="{4B2286AD-5452-9345-A613-F4287A508AD1}" type="datetimeFigureOut">
               <a:rPr lang="en-US" smtClean="0"/>
-              <a:t>8/31/15</a:t>
+              <a:t>9/4/15</a:t>
             </a:fld>
             <a:endParaRPr lang="en-US"/>
           </a:p>
@@ -1342,7 +1342,7 @@
           <a:p>
             <a:fld id="{4B2286AD-5452-9345-A613-F4287A508AD1}" type="datetimeFigureOut">
               <a:rPr lang="en-US" smtClean="0"/>
-              <a:t>8/31/15</a:t>
+              <a:t>9/4/15</a:t>
             </a:fld>
             <a:endParaRPr lang="en-US"/>
           </a:p>
@@ -1764,7 +1764,7 @@
           <a:p>
             <a:fld id="{4B2286AD-5452-9345-A613-F4287A508AD1}" type="datetimeFigureOut">
               <a:rPr lang="en-US" smtClean="0"/>
-              <a:t>8/31/15</a:t>
+              <a:t>9/4/15</a:t>
             </a:fld>
             <a:endParaRPr lang="en-US"/>
           </a:p>
@@ -1882,7 +1882,7 @@
           <a:p>
             <a:fld id="{4B2286AD-5452-9345-A613-F4287A508AD1}" type="datetimeFigureOut">
               <a:rPr lang="en-US" smtClean="0"/>
-              <a:t>8/31/15</a:t>
+              <a:t>9/4/15</a:t>
             </a:fld>
             <a:endParaRPr lang="en-US"/>
           </a:p>
@@ -1977,7 +1977,7 @@
           <a:p>
             <a:fld id="{4B2286AD-5452-9345-A613-F4287A508AD1}" type="datetimeFigureOut">
               <a:rPr lang="en-US" smtClean="0"/>
-              <a:t>8/31/15</a:t>
+              <a:t>9/4/15</a:t>
             </a:fld>
             <a:endParaRPr lang="en-US"/>
           </a:p>
@@ -2254,7 +2254,7 @@
           <a:p>
             <a:fld id="{4B2286AD-5452-9345-A613-F4287A508AD1}" type="datetimeFigureOut">
               <a:rPr lang="en-US" smtClean="0"/>
-              <a:t>8/31/15</a:t>
+              <a:t>9/4/15</a:t>
             </a:fld>
             <a:endParaRPr lang="en-US"/>
           </a:p>
@@ -2507,7 +2507,7 @@
           <a:p>
             <a:fld id="{4B2286AD-5452-9345-A613-F4287A508AD1}" type="datetimeFigureOut">
               <a:rPr lang="en-US" smtClean="0"/>
-              <a:t>8/31/15</a:t>
+              <a:t>9/4/15</a:t>
             </a:fld>
             <a:endParaRPr lang="en-US"/>
           </a:p>
@@ -2720,7 +2720,7 @@
           <a:p>
             <a:fld id="{4B2286AD-5452-9345-A613-F4287A508AD1}" type="datetimeFigureOut">
               <a:rPr lang="en-US" smtClean="0"/>
-              <a:t>8/31/15</a:t>
+              <a:t>9/4/15</a:t>
             </a:fld>
             <a:endParaRPr lang="en-US"/>
           </a:p>
@@ -3095,67 +3095,6 @@
           <a:chExt cx="0" cy="0"/>
         </a:xfrm>
       </p:grpSpPr>
-      <p:pic>
-        <p:nvPicPr>
-          <p:cNvPr id="7" name="Picture 6" descr="race_car.png"/>
-          <p:cNvPicPr>
-            <a:picLocks noChangeAspect="1"/>
-          </p:cNvPicPr>
-          <p:nvPr/>
-        </p:nvPicPr>
-        <p:blipFill rotWithShape="1">
-          <a:blip r:embed="rId2">
-            <a:extLst>
-              <a:ext uri="{28A0092B-C50C-407E-A947-70E740481C1C}">
-                <a14:useLocalDpi xmlns:a14="http://schemas.microsoft.com/office/drawing/2010/main" val="0"/>
-              </a:ext>
-            </a:extLst>
-          </a:blip>
-          <a:srcRect l="14501" r="12164"/>
-          <a:stretch/>
-        </p:blipFill>
-        <p:spPr>
-          <a:xfrm>
-            <a:off x="1841061" y="0"/>
-            <a:ext cx="2650774" cy="2710972"/>
-          </a:xfrm>
-          <a:prstGeom prst="rect">
-            <a:avLst/>
-          </a:prstGeom>
-          <a:ln>
-            <a:noFill/>
-          </a:ln>
-        </p:spPr>
-      </p:pic>
-      <p:pic>
-        <p:nvPicPr>
-          <p:cNvPr id="8" name="Picture 7" descr="box2D_arm.png"/>
-          <p:cNvPicPr>
-            <a:picLocks noChangeAspect="1"/>
-          </p:cNvPicPr>
-          <p:nvPr/>
-        </p:nvPicPr>
-        <p:blipFill rotWithShape="1">
-          <a:blip r:embed="rId3">
-            <a:extLst>
-              <a:ext uri="{28A0092B-C50C-407E-A947-70E740481C1C}">
-                <a14:useLocalDpi xmlns:a14="http://schemas.microsoft.com/office/drawing/2010/main" val="0"/>
-              </a:ext>
-            </a:extLst>
-          </a:blip>
-          <a:srcRect l="14008" t="20687" b="5682"/>
-          <a:stretch/>
-        </p:blipFill>
-        <p:spPr>
-          <a:xfrm>
-            <a:off x="5554168" y="0"/>
-            <a:ext cx="3260467" cy="3293563"/>
-          </a:xfrm>
-          <a:prstGeom prst="rect">
-            <a:avLst/>
-          </a:prstGeom>
-        </p:spPr>
-      </p:pic>
       <p:sp>
         <p:nvSpPr>
           <p:cNvPr id="10" name="TextBox 9"/>
@@ -3221,14 +3160,7 @@
                 <a:latin typeface="Palatino"/>
                 <a:cs typeface="Palatino"/>
               </a:rPr>
-              <a:t>(b) Grasping in </a:t>
-            </a:r>
-            <a:r>
-              <a:rPr lang="en-US" sz="1600" dirty="0" smtClean="0">
-                <a:latin typeface="Palatino"/>
-                <a:cs typeface="Palatino"/>
-              </a:rPr>
-              <a:t>Clutter in Box2D</a:t>
+              <a:t>(b) Grasping in Clutter in Box2D</a:t>
             </a:r>
             <a:endParaRPr lang="en-US" sz="1600" dirty="0">
               <a:latin typeface="Palatino"/>
@@ -3265,21 +3197,7 @@
                 <a:latin typeface="Palatino"/>
                 <a:cs typeface="Palatino"/>
               </a:rPr>
-              <a:t>(c) </a:t>
-            </a:r>
-            <a:r>
-              <a:rPr lang="en-US" sz="1600" dirty="0" smtClean="0">
-                <a:latin typeface="Palatino"/>
-                <a:cs typeface="Palatino"/>
-              </a:rPr>
-              <a:t>Surgical Needle </a:t>
-            </a:r>
-            <a:r>
-              <a:rPr lang="en-US" sz="1600" dirty="0" smtClean="0">
-                <a:latin typeface="Palatino"/>
-                <a:cs typeface="Palatino"/>
-              </a:rPr>
-              <a:t>Insertion </a:t>
+              <a:t>(c) Surgical Needle Insertion </a:t>
             </a:r>
             <a:endParaRPr lang="en-US" sz="1600" dirty="0">
               <a:latin typeface="Palatino"/>
@@ -3297,7 +3215,7 @@
           <p:nvPr/>
         </p:nvPicPr>
         <p:blipFill>
-          <a:blip r:embed="rId4">
+          <a:blip r:embed="rId2">
             <a:extLst>
               <a:ext uri="{28A0092B-C50C-407E-A947-70E740481C1C}">
                 <a14:useLocalDpi xmlns:a14="http://schemas.microsoft.com/office/drawing/2010/main" val="0"/>
@@ -3318,9 +3236,105 @@
           </a:prstGeom>
         </p:spPr>
       </p:pic>
+      <p:sp>
+        <p:nvSpPr>
+          <p:cNvPr id="14" name="TextBox 13"/>
+          <p:cNvSpPr txBox="1"/>
+          <p:nvPr/>
+        </p:nvSpPr>
+        <p:spPr>
+          <a:xfrm>
+            <a:off x="5341941" y="6508450"/>
+            <a:ext cx="2998762" cy="338554"/>
+          </a:xfrm>
+          <a:prstGeom prst="rect">
+            <a:avLst/>
+          </a:prstGeom>
+          <a:noFill/>
+        </p:spPr>
+        <p:txBody>
+          <a:bodyPr wrap="square" rtlCol="0">
+            <a:spAutoFit/>
+          </a:bodyPr>
+          <a:lstStyle/>
+          <a:p>
+            <a:r>
+              <a:rPr lang="en-US" sz="1600" dirty="0" smtClean="0">
+                <a:latin typeface="Palatino"/>
+                <a:cs typeface="Palatino"/>
+              </a:rPr>
+              <a:t>(d) Performance of SHIV</a:t>
+            </a:r>
+            <a:endParaRPr lang="en-US" sz="1600" dirty="0">
+              <a:latin typeface="Palatino"/>
+              <a:cs typeface="Palatino"/>
+            </a:endParaRPr>
+          </a:p>
+        </p:txBody>
+      </p:sp>
       <p:pic>
         <p:nvPicPr>
-          <p:cNvPr id="2" name="Picture 1" descr="grasp_clutter.eps"/>
+          <p:cNvPr id="3" name="Picture 2" descr="race_car.eps"/>
+          <p:cNvPicPr>
+            <a:picLocks noChangeAspect="1"/>
+          </p:cNvPicPr>
+          <p:nvPr/>
+        </p:nvPicPr>
+        <p:blipFill>
+          <a:blip r:embed="rId3">
+            <a:extLst>
+              <a:ext uri="{28A0092B-C50C-407E-A947-70E740481C1C}">
+                <a14:useLocalDpi xmlns:a14="http://schemas.microsoft.com/office/drawing/2010/main" val="0"/>
+              </a:ext>
+            </a:extLst>
+          </a:blip>
+          <a:stretch>
+            <a:fillRect/>
+          </a:stretch>
+        </p:blipFill>
+        <p:spPr>
+          <a:xfrm>
+            <a:off x="1701967" y="83557"/>
+            <a:ext cx="2552090" cy="2785732"/>
+          </a:xfrm>
+          <a:prstGeom prst="rect">
+            <a:avLst/>
+          </a:prstGeom>
+        </p:spPr>
+      </p:pic>
+      <p:pic>
+        <p:nvPicPr>
+          <p:cNvPr id="5" name="Picture 4" descr="box2d_arm.eps"/>
+          <p:cNvPicPr>
+            <a:picLocks noChangeAspect="1"/>
+          </p:cNvPicPr>
+          <p:nvPr/>
+        </p:nvPicPr>
+        <p:blipFill>
+          <a:blip r:embed="rId4">
+            <a:extLst>
+              <a:ext uri="{28A0092B-C50C-407E-A947-70E740481C1C}">
+                <a14:useLocalDpi xmlns:a14="http://schemas.microsoft.com/office/drawing/2010/main" val="0"/>
+              </a:ext>
+            </a:extLst>
+          </a:blip>
+          <a:stretch>
+            <a:fillRect/>
+          </a:stretch>
+        </p:blipFill>
+        <p:spPr>
+          <a:xfrm>
+            <a:off x="5653989" y="130401"/>
+            <a:ext cx="2705117" cy="3182491"/>
+          </a:xfrm>
+          <a:prstGeom prst="rect">
+            <a:avLst/>
+          </a:prstGeom>
+        </p:spPr>
+      </p:pic>
+      <p:pic>
+        <p:nvPicPr>
+          <p:cNvPr id="6" name="Picture 5" descr="grasp_clutter-eps-converted-to.pdf"/>
           <p:cNvPicPr>
             <a:picLocks noChangeAspect="1"/>
           </p:cNvPicPr>
@@ -3340,50 +3354,14 @@
         </p:blipFill>
         <p:spPr>
           <a:xfrm>
-            <a:off x="4932591" y="3705542"/>
-            <a:ext cx="3882044" cy="2926464"/>
+            <a:off x="4965610" y="3829817"/>
+            <a:ext cx="4061427" cy="2639071"/>
           </a:xfrm>
           <a:prstGeom prst="rect">
             <a:avLst/>
           </a:prstGeom>
         </p:spPr>
       </p:pic>
-      <p:sp>
-        <p:nvSpPr>
-          <p:cNvPr id="14" name="TextBox 13"/>
-          <p:cNvSpPr txBox="1"/>
-          <p:nvPr/>
-        </p:nvSpPr>
-        <p:spPr>
-          <a:xfrm>
-            <a:off x="5341941" y="6508450"/>
-            <a:ext cx="2998762" cy="338554"/>
-          </a:xfrm>
-          <a:prstGeom prst="rect">
-            <a:avLst/>
-          </a:prstGeom>
-          <a:noFill/>
-        </p:spPr>
-        <p:txBody>
-          <a:bodyPr wrap="square" rtlCol="0">
-            <a:spAutoFit/>
-          </a:bodyPr>
-          <a:lstStyle/>
-          <a:p>
-            <a:r>
-              <a:rPr lang="en-US" sz="1600" dirty="0" smtClean="0">
-                <a:latin typeface="Palatino"/>
-                <a:cs typeface="Palatino"/>
-              </a:rPr>
-              <a:t>(d) Performance of SHIV</a:t>
-            </a:r>
-            <a:endParaRPr lang="en-US" sz="1600" dirty="0">
-              <a:latin typeface="Palatino"/>
-              <a:cs typeface="Palatino"/>
-            </a:endParaRPr>
-          </a:p>
-        </p:txBody>
-      </p:sp>
     </p:spTree>
     <p:extLst>
       <p:ext uri="{BB962C8B-B14F-4D97-AF65-F5344CB8AC3E}">

</xml_diff>

<commit_message>
added Ken's comments ...v20
</commit_message>
<xml_diff>
--- a/figures/teaser.pptx
+++ b/figures/teaser.pptx
@@ -3103,7 +3103,7 @@
         </p:nvSpPr>
         <p:spPr>
           <a:xfrm>
-            <a:off x="1841061" y="2785732"/>
+            <a:off x="1701967" y="2869289"/>
             <a:ext cx="2217689" cy="338554"/>
           </a:xfrm>
           <a:prstGeom prst="rect">
@@ -3117,17 +3117,16 @@
           </a:bodyPr>
           <a:lstStyle/>
           <a:p>
-            <a:pPr algn="ctr"/>
             <a:r>
               <a:rPr lang="en-US" sz="1600" dirty="0" smtClean="0">
-                <a:latin typeface="Palatino"/>
-                <a:cs typeface="Palatino"/>
+                <a:latin typeface="Times New Roman"/>
+                <a:cs typeface="Times New Roman"/>
               </a:rPr>
               <a:t>(a) Driving Simulator </a:t>
             </a:r>
             <a:endParaRPr lang="en-US" sz="1600" dirty="0">
-              <a:latin typeface="Palatino"/>
-              <a:cs typeface="Palatino"/>
+              <a:latin typeface="Times New Roman"/>
+              <a:cs typeface="Times New Roman"/>
             </a:endParaRPr>
           </a:p>
         </p:txBody>
@@ -3140,8 +3139,8 @@
         </p:nvSpPr>
         <p:spPr>
           <a:xfrm>
-            <a:off x="5326412" y="3366988"/>
-            <a:ext cx="3199784" cy="338554"/>
+            <a:off x="4965610" y="2871052"/>
+            <a:ext cx="3017166" cy="338554"/>
           </a:xfrm>
           <a:prstGeom prst="rect">
             <a:avLst/>
@@ -3154,17 +3153,30 @@
           </a:bodyPr>
           <a:lstStyle/>
           <a:p>
-            <a:pPr algn="ctr"/>
+            <a:r>
+              <a:rPr lang="en-US" sz="1600" dirty="0">
+                <a:latin typeface="Times New Roman"/>
+                <a:cs typeface="Times New Roman"/>
+              </a:rPr>
+              <a:t>(</a:t>
+            </a:r>
             <a:r>
               <a:rPr lang="en-US" sz="1600" dirty="0" smtClean="0">
-                <a:latin typeface="Palatino"/>
-                <a:cs typeface="Palatino"/>
+                <a:latin typeface="Times New Roman"/>
+                <a:cs typeface="Times New Roman"/>
               </a:rPr>
-              <a:t>(b) Grasping in Clutter in Box2D</a:t>
+              <a:t>b</a:t>
+            </a:r>
+            <a:r>
+              <a:rPr lang="en-US" sz="1600" dirty="0" smtClean="0">
+                <a:latin typeface="Times New Roman"/>
+                <a:cs typeface="Times New Roman"/>
+              </a:rPr>
+              <a:t>) Grasping in Clutter in Box2D</a:t>
             </a:r>
             <a:endParaRPr lang="en-US" sz="1600" dirty="0">
-              <a:latin typeface="Palatino"/>
-              <a:cs typeface="Palatino"/>
+              <a:latin typeface="Times New Roman"/>
+              <a:cs typeface="Times New Roman"/>
             </a:endParaRPr>
           </a:p>
         </p:txBody>
@@ -3177,7 +3189,7 @@
         </p:nvSpPr>
         <p:spPr>
           <a:xfrm>
-            <a:off x="1701967" y="6468888"/>
+            <a:off x="1701967" y="6466824"/>
             <a:ext cx="2998762" cy="338554"/>
           </a:xfrm>
           <a:prstGeom prst="rect">
@@ -3191,17 +3203,16 @@
           </a:bodyPr>
           <a:lstStyle/>
           <a:p>
-            <a:pPr algn="ctr"/>
             <a:r>
               <a:rPr lang="en-US" sz="1600" dirty="0" smtClean="0">
-                <a:latin typeface="Palatino"/>
-                <a:cs typeface="Palatino"/>
+                <a:latin typeface="Times New Roman"/>
+                <a:cs typeface="Times New Roman"/>
               </a:rPr>
               <a:t>(c) Surgical Needle Insertion </a:t>
             </a:r>
             <a:endParaRPr lang="en-US" sz="1600" dirty="0">
-              <a:latin typeface="Palatino"/>
-              <a:cs typeface="Palatino"/>
+              <a:latin typeface="Times New Roman"/>
+              <a:cs typeface="Times New Roman"/>
             </a:endParaRPr>
           </a:p>
         </p:txBody>
@@ -3244,7 +3255,7 @@
         </p:nvSpPr>
         <p:spPr>
           <a:xfrm>
-            <a:off x="5341941" y="6508450"/>
+            <a:off x="4965610" y="6466824"/>
             <a:ext cx="2998762" cy="338554"/>
           </a:xfrm>
           <a:prstGeom prst="rect">
@@ -3260,21 +3271,21 @@
           <a:p>
             <a:r>
               <a:rPr lang="en-US" sz="1600" dirty="0" smtClean="0">
-                <a:latin typeface="Palatino"/>
-                <a:cs typeface="Palatino"/>
+                <a:latin typeface="Times New Roman"/>
+                <a:cs typeface="Times New Roman"/>
               </a:rPr>
               <a:t>(d) Performance of SHIV</a:t>
             </a:r>
             <a:endParaRPr lang="en-US" sz="1600" dirty="0">
-              <a:latin typeface="Palatino"/>
-              <a:cs typeface="Palatino"/>
+              <a:latin typeface="Times New Roman"/>
+              <a:cs typeface="Times New Roman"/>
             </a:endParaRPr>
           </a:p>
         </p:txBody>
       </p:sp>
       <p:pic>
         <p:nvPicPr>
-          <p:cNvPr id="3" name="Picture 2" descr="race_car.eps"/>
+          <p:cNvPr id="5" name="Picture 4" descr="box2d_arm.eps"/>
           <p:cNvPicPr>
             <a:picLocks noChangeAspect="1"/>
           </p:cNvPicPr>
@@ -3294,8 +3305,8 @@
         </p:blipFill>
         <p:spPr>
           <a:xfrm>
-            <a:off x="1701967" y="83557"/>
-            <a:ext cx="2552090" cy="2785732"/>
+            <a:off x="5259255" y="130402"/>
+            <a:ext cx="2614745" cy="2772144"/>
           </a:xfrm>
           <a:prstGeom prst="rect">
             <a:avLst/>
@@ -3304,7 +3315,7 @@
       </p:pic>
       <p:pic>
         <p:nvPicPr>
-          <p:cNvPr id="5" name="Picture 4" descr="box2d_arm.eps"/>
+          <p:cNvPr id="9" name="Picture 8" descr="race_car.eps"/>
           <p:cNvPicPr>
             <a:picLocks noChangeAspect="1"/>
           </p:cNvPicPr>
@@ -3324,8 +3335,8 @@
         </p:blipFill>
         <p:spPr>
           <a:xfrm>
-            <a:off x="5653989" y="130401"/>
-            <a:ext cx="2705117" cy="3182491"/>
+            <a:off x="1553631" y="130402"/>
+            <a:ext cx="2486975" cy="2714656"/>
           </a:xfrm>
           <a:prstGeom prst="rect">
             <a:avLst/>
@@ -3334,14 +3345,38 @@
       </p:pic>
       <p:pic>
         <p:nvPicPr>
-          <p:cNvPr id="6" name="Picture 5" descr="grasp_clutter-eps-converted-to.pdf"/>
+          <p:cNvPr id="13" name="Picture 12"/>
           <p:cNvPicPr>
             <a:picLocks noChangeAspect="1"/>
           </p:cNvPicPr>
           <p:nvPr/>
         </p:nvPicPr>
         <p:blipFill>
-          <a:blip r:embed="rId5">
+          <a:blip r:embed="rId5"/>
+          <a:stretch>
+            <a:fillRect/>
+          </a:stretch>
+        </p:blipFill>
+        <p:spPr>
+          <a:xfrm rot="6881422" flipV="1">
+            <a:off x="3531331" y="2075473"/>
+            <a:ext cx="339536" cy="168353"/>
+          </a:xfrm>
+          <a:prstGeom prst="rect">
+            <a:avLst/>
+          </a:prstGeom>
+        </p:spPr>
+      </p:pic>
+      <p:pic>
+        <p:nvPicPr>
+          <p:cNvPr id="15" name="Picture 14" descr="grasp_clutter.eps"/>
+          <p:cNvPicPr>
+            <a:picLocks noChangeAspect="1"/>
+          </p:cNvPicPr>
+          <p:nvPr/>
+        </p:nvPicPr>
+        <p:blipFill>
+          <a:blip r:embed="rId6">
             <a:extLst>
               <a:ext uri="{28A0092B-C50C-407E-A947-70E740481C1C}">
                 <a14:useLocalDpi xmlns:a14="http://schemas.microsoft.com/office/drawing/2010/main" val="0"/>
@@ -3354,8 +3389,8 @@
         </p:blipFill>
         <p:spPr>
           <a:xfrm>
-            <a:off x="4965610" y="3829817"/>
-            <a:ext cx="4061427" cy="2639071"/>
+            <a:off x="4958168" y="3393454"/>
+            <a:ext cx="2915832" cy="3073370"/>
           </a:xfrm>
           <a:prstGeom prst="rect">
             <a:avLst/>

</xml_diff>